<commit_message>
Added tutorial instructions to ppt
</commit_message>
<xml_diff>
--- a/Lecture_4/A Taste of Fisheries Science_presentation_4.pptx
+++ b/Lecture_4/A Taste of Fisheries Science_presentation_4.pptx
@@ -333,7 +333,7 @@
           <a:p>
             <a:fld id="{2398E56C-5B4E-4C10-84AF-04B7AE478ABE}" type="datetimeFigureOut">
               <a:rPr lang="en-US" smtClean="0"/>
-              <a:t>2/18/2023</a:t>
+              <a:t>2/27/2023</a:t>
             </a:fld>
             <a:endParaRPr lang="en-US"/>
           </a:p>
@@ -2563,7 +2563,7 @@
           <a:p>
             <a:fld id="{5D8BE0D3-E4A9-48BC-9171-F8D206744B4D}" type="datetimeFigureOut">
               <a:rPr lang="en-US" smtClean="0"/>
-              <a:t>2/18/2023</a:t>
+              <a:t>2/27/2023</a:t>
             </a:fld>
             <a:endParaRPr lang="en-US"/>
           </a:p>
@@ -2771,7 +2771,7 @@
           <a:p>
             <a:fld id="{5D8BE0D3-E4A9-48BC-9171-F8D206744B4D}" type="datetimeFigureOut">
               <a:rPr lang="en-US" smtClean="0"/>
-              <a:t>2/18/2023</a:t>
+              <a:t>2/27/2023</a:t>
             </a:fld>
             <a:endParaRPr lang="en-US"/>
           </a:p>
@@ -3027,7 +3027,7 @@
           <a:p>
             <a:fld id="{5D8BE0D3-E4A9-48BC-9171-F8D206744B4D}" type="datetimeFigureOut">
               <a:rPr lang="en-US" smtClean="0"/>
-              <a:t>2/18/2023</a:t>
+              <a:t>2/27/2023</a:t>
             </a:fld>
             <a:endParaRPr lang="en-US"/>
           </a:p>
@@ -3197,7 +3197,7 @@
           <a:p>
             <a:fld id="{5D8BE0D3-E4A9-48BC-9171-F8D206744B4D}" type="datetimeFigureOut">
               <a:rPr lang="en-US" smtClean="0"/>
-              <a:t>2/18/2023</a:t>
+              <a:t>2/27/2023</a:t>
             </a:fld>
             <a:endParaRPr lang="en-US"/>
           </a:p>
@@ -3540,7 +3540,7 @@
           <a:p>
             <a:fld id="{5D8BE0D3-E4A9-48BC-9171-F8D206744B4D}" type="datetimeFigureOut">
               <a:rPr lang="en-US" smtClean="0"/>
-              <a:t>2/18/2023</a:t>
+              <a:t>2/27/2023</a:t>
             </a:fld>
             <a:endParaRPr lang="en-US"/>
           </a:p>
@@ -3815,7 +3815,7 @@
           <a:p>
             <a:fld id="{5D8BE0D3-E4A9-48BC-9171-F8D206744B4D}" type="datetimeFigureOut">
               <a:rPr lang="en-US" smtClean="0"/>
-              <a:t>2/18/2023</a:t>
+              <a:t>2/27/2023</a:t>
             </a:fld>
             <a:endParaRPr lang="en-US"/>
           </a:p>
@@ -4193,7 +4193,7 @@
           <a:p>
             <a:fld id="{5D8BE0D3-E4A9-48BC-9171-F8D206744B4D}" type="datetimeFigureOut">
               <a:rPr lang="en-US" smtClean="0"/>
-              <a:t>2/18/2023</a:t>
+              <a:t>2/27/2023</a:t>
             </a:fld>
             <a:endParaRPr lang="en-US"/>
           </a:p>
@@ -4311,7 +4311,7 @@
           <a:p>
             <a:fld id="{5D8BE0D3-E4A9-48BC-9171-F8D206744B4D}" type="datetimeFigureOut">
               <a:rPr lang="en-US" smtClean="0"/>
-              <a:t>2/18/2023</a:t>
+              <a:t>2/27/2023</a:t>
             </a:fld>
             <a:endParaRPr lang="en-US"/>
           </a:p>
@@ -4482,7 +4482,7 @@
           <a:p>
             <a:fld id="{5D8BE0D3-E4A9-48BC-9171-F8D206744B4D}" type="datetimeFigureOut">
               <a:rPr lang="en-US" smtClean="0"/>
-              <a:t>2/18/2023</a:t>
+              <a:t>2/27/2023</a:t>
             </a:fld>
             <a:endParaRPr lang="en-US"/>
           </a:p>
@@ -4836,7 +4836,7 @@
           <a:p>
             <a:fld id="{5D8BE0D3-E4A9-48BC-9171-F8D206744B4D}" type="datetimeFigureOut">
               <a:rPr lang="en-US" smtClean="0"/>
-              <a:t>2/18/2023</a:t>
+              <a:t>2/27/2023</a:t>
             </a:fld>
             <a:endParaRPr lang="en-US"/>
           </a:p>
@@ -5213,7 +5213,7 @@
           <a:p>
             <a:fld id="{5D8BE0D3-E4A9-48BC-9171-F8D206744B4D}" type="datetimeFigureOut">
               <a:rPr lang="en-US" smtClean="0"/>
-              <a:t>2/18/2023</a:t>
+              <a:t>2/27/2023</a:t>
             </a:fld>
             <a:endParaRPr lang="en-US"/>
           </a:p>
@@ -5498,7 +5498,7 @@
           <a:p>
             <a:fld id="{5D8BE0D3-E4A9-48BC-9171-F8D206744B4D}" type="datetimeFigureOut">
               <a:rPr lang="en-US" smtClean="0"/>
-              <a:t>2/18/2023</a:t>
+              <a:t>2/27/2023</a:t>
             </a:fld>
             <a:endParaRPr lang="en-US"/>
           </a:p>
@@ -7321,8 +7321,8 @@
           </a:p>
         </p:txBody>
       </p:sp>
-      <mc:AlternateContent xmlns:mc="http://schemas.openxmlformats.org/markup-compatibility/2006">
-        <mc:Choice xmlns:a14="http://schemas.microsoft.com/office/drawing/2010/main" Requires="a14">
+      <mc:AlternateContent xmlns:mc="http://schemas.openxmlformats.org/markup-compatibility/2006" xmlns:a14="http://schemas.microsoft.com/office/drawing/2010/main">
+        <mc:Choice Requires="a14">
           <p:sp>
             <p:nvSpPr>
               <p:cNvPr id="6" name="Content Placeholder 5">
@@ -7596,7 +7596,7 @@
             </p:txBody>
           </p:sp>
         </mc:Choice>
-        <mc:Fallback>
+        <mc:Fallback xmlns="">
           <p:sp>
             <p:nvSpPr>
               <p:cNvPr id="6" name="Content Placeholder 5">
@@ -7706,8 +7706,8 @@
           </a:prstGeom>
         </p:spPr>
       </p:pic>
-      <mc:AlternateContent xmlns:mc="http://schemas.openxmlformats.org/markup-compatibility/2006">
-        <mc:Choice xmlns:a14="http://schemas.microsoft.com/office/drawing/2010/main" Requires="a14">
+      <mc:AlternateContent xmlns:mc="http://schemas.openxmlformats.org/markup-compatibility/2006" xmlns:a14="http://schemas.microsoft.com/office/drawing/2010/main">
+        <mc:Choice Requires="a14">
           <p:sp>
             <p:nvSpPr>
               <p:cNvPr id="6" name="Content Placeholder 5">
@@ -8023,7 +8023,7 @@
             </p:txBody>
           </p:sp>
         </mc:Choice>
-        <mc:Fallback>
+        <mc:Fallback xmlns="">
           <p:sp>
             <p:nvSpPr>
               <p:cNvPr id="6" name="Content Placeholder 5">
@@ -8430,8 +8430,8 @@
           <a:chExt cx="0" cy="0"/>
         </a:xfrm>
       </p:grpSpPr>
-      <mc:AlternateContent xmlns:mc="http://schemas.openxmlformats.org/markup-compatibility/2006">
-        <mc:Choice xmlns:a14="http://schemas.microsoft.com/office/drawing/2010/main" Requires="a14">
+      <mc:AlternateContent xmlns:mc="http://schemas.openxmlformats.org/markup-compatibility/2006" xmlns:a14="http://schemas.microsoft.com/office/drawing/2010/main">
+        <mc:Choice Requires="a14">
           <p:sp>
             <p:nvSpPr>
               <p:cNvPr id="6" name="Content Placeholder 5">
@@ -8764,7 +8764,7 @@
             </p:txBody>
           </p:sp>
         </mc:Choice>
-        <mc:Fallback>
+        <mc:Fallback xmlns="">
           <p:sp>
             <p:nvSpPr>
               <p:cNvPr id="6" name="Content Placeholder 5">
@@ -9405,8 +9405,8 @@
           </a:prstGeom>
         </p:spPr>
       </p:pic>
-      <mc:AlternateContent xmlns:mc="http://schemas.openxmlformats.org/markup-compatibility/2006">
-        <mc:Choice xmlns:a14="http://schemas.microsoft.com/office/drawing/2010/main" Requires="a14">
+      <mc:AlternateContent xmlns:mc="http://schemas.openxmlformats.org/markup-compatibility/2006" xmlns:a14="http://schemas.microsoft.com/office/drawing/2010/main">
+        <mc:Choice Requires="a14">
           <p:sp>
             <p:nvSpPr>
               <p:cNvPr id="7" name="TextBox 6">
@@ -9435,6 +9435,7 @@
               </a:bodyPr>
               <a:lstStyle/>
               <a:p>
+                <a:pPr/>
                 <a14:m>
                   <m:oMathPara xmlns:m="http://schemas.openxmlformats.org/officeDocument/2006/math">
                     <m:oMathParaPr>
@@ -9646,7 +9647,7 @@
             </p:txBody>
           </p:sp>
         </mc:Choice>
-        <mc:Fallback>
+        <mc:Fallback xmlns="">
           <p:sp>
             <p:nvSpPr>
               <p:cNvPr id="7" name="TextBox 6">
@@ -9691,8 +9692,8 @@
           </p:sp>
         </mc:Fallback>
       </mc:AlternateContent>
-      <mc:AlternateContent xmlns:mc="http://schemas.openxmlformats.org/markup-compatibility/2006">
-        <mc:Choice xmlns:a14="http://schemas.microsoft.com/office/drawing/2010/main" Requires="a14">
+      <mc:AlternateContent xmlns:mc="http://schemas.openxmlformats.org/markup-compatibility/2006" xmlns:a14="http://schemas.microsoft.com/office/drawing/2010/main">
+        <mc:Choice Requires="a14">
           <p:sp>
             <p:nvSpPr>
               <p:cNvPr id="10" name="TextBox 9">
@@ -9919,7 +9920,7 @@
             </p:txBody>
           </p:sp>
         </mc:Choice>
-        <mc:Fallback>
+        <mc:Fallback xmlns="">
           <p:sp>
             <p:nvSpPr>
               <p:cNvPr id="10" name="TextBox 9">
@@ -9964,8 +9965,8 @@
           </p:sp>
         </mc:Fallback>
       </mc:AlternateContent>
-      <mc:AlternateContent xmlns:mc="http://schemas.openxmlformats.org/markup-compatibility/2006">
-        <mc:Choice xmlns:a14="http://schemas.microsoft.com/office/drawing/2010/main" Requires="a14">
+      <mc:AlternateContent xmlns:mc="http://schemas.openxmlformats.org/markup-compatibility/2006" xmlns:a14="http://schemas.microsoft.com/office/drawing/2010/main">
+        <mc:Choice Requires="a14">
           <p:sp>
             <p:nvSpPr>
               <p:cNvPr id="11" name="TextBox 10">
@@ -10202,7 +10203,7 @@
             </p:txBody>
           </p:sp>
         </mc:Choice>
-        <mc:Fallback>
+        <mc:Fallback xmlns="">
           <p:sp>
             <p:nvSpPr>
               <p:cNvPr id="11" name="TextBox 10">
@@ -10563,8 +10564,8 @@
           </a:prstGeom>
         </p:spPr>
       </p:pic>
-      <mc:AlternateContent xmlns:mc="http://schemas.openxmlformats.org/markup-compatibility/2006">
-        <mc:Choice xmlns:a14="http://schemas.microsoft.com/office/drawing/2010/main" Requires="a14">
+      <mc:AlternateContent xmlns:mc="http://schemas.openxmlformats.org/markup-compatibility/2006" xmlns:a14="http://schemas.microsoft.com/office/drawing/2010/main">
+        <mc:Choice Requires="a14">
           <p:sp>
             <p:nvSpPr>
               <p:cNvPr id="16" name="TextBox 15">
@@ -10892,7 +10893,7 @@
             </p:txBody>
           </p:sp>
         </mc:Choice>
-        <mc:Fallback>
+        <mc:Fallback xmlns="">
           <p:sp>
             <p:nvSpPr>
               <p:cNvPr id="16" name="TextBox 15">
@@ -11123,8 +11124,8 @@
           </p:sp>
         </p:grpSp>
       </p:grpSp>
-      <mc:AlternateContent xmlns:mc="http://schemas.openxmlformats.org/markup-compatibility/2006">
-        <mc:Choice xmlns:p14="http://schemas.microsoft.com/office/powerpoint/2010/main" Requires="p14">
+      <mc:AlternateContent xmlns:mc="http://schemas.openxmlformats.org/markup-compatibility/2006" xmlns:p14="http://schemas.microsoft.com/office/powerpoint/2010/main">
+        <mc:Choice Requires="p14">
           <p:contentPart p14:bwMode="auto" r:id="rId7">
             <p14:nvContentPartPr>
               <p14:cNvPr id="26" name="Ink 25">
@@ -11143,7 +11144,7 @@
             </p14:xfrm>
           </p:contentPart>
         </mc:Choice>
-        <mc:Fallback>
+        <mc:Fallback xmlns="">
           <p:pic>
             <p:nvPicPr>
               <p:cNvPr id="26" name="Ink 25">
@@ -11942,8 +11943,8 @@
           </a:p>
         </p:txBody>
       </p:sp>
-      <mc:AlternateContent xmlns:mc="http://schemas.openxmlformats.org/markup-compatibility/2006">
-        <mc:Choice xmlns:a14="http://schemas.microsoft.com/office/drawing/2010/main" Requires="a14">
+      <mc:AlternateContent xmlns:mc="http://schemas.openxmlformats.org/markup-compatibility/2006" xmlns:a14="http://schemas.microsoft.com/office/drawing/2010/main">
+        <mc:Choice Requires="a14">
           <p:sp>
             <p:nvSpPr>
               <p:cNvPr id="16" name="TextBox 15">
@@ -12271,7 +12272,7 @@
             </p:txBody>
           </p:sp>
         </mc:Choice>
-        <mc:Fallback>
+        <mc:Fallback xmlns="">
           <p:sp>
             <p:nvSpPr>
               <p:cNvPr id="16" name="TextBox 15">
@@ -12719,8 +12720,8 @@
           </a:prstGeom>
         </p:spPr>
       </p:pic>
-      <mc:AlternateContent xmlns:mc="http://schemas.openxmlformats.org/markup-compatibility/2006">
-        <mc:Choice xmlns:a14="http://schemas.microsoft.com/office/drawing/2010/main" Requires="a14">
+      <mc:AlternateContent xmlns:mc="http://schemas.openxmlformats.org/markup-compatibility/2006" xmlns:a14="http://schemas.microsoft.com/office/drawing/2010/main">
+        <mc:Choice Requires="a14">
           <p:sp>
             <p:nvSpPr>
               <p:cNvPr id="6" name="Content Placeholder 5">
@@ -12978,7 +12979,7 @@
             </p:txBody>
           </p:sp>
         </mc:Choice>
-        <mc:Fallback>
+        <mc:Fallback xmlns="">
           <p:sp>
             <p:nvSpPr>
               <p:cNvPr id="6" name="Content Placeholder 5">
@@ -13700,8 +13701,8 @@
           <a:chExt cx="0" cy="0"/>
         </a:xfrm>
       </p:grpSpPr>
-      <mc:AlternateContent xmlns:mc="http://schemas.openxmlformats.org/markup-compatibility/2006">
-        <mc:Choice xmlns:a14="http://schemas.microsoft.com/office/drawing/2010/main" Requires="a14">
+      <mc:AlternateContent xmlns:mc="http://schemas.openxmlformats.org/markup-compatibility/2006" xmlns:a14="http://schemas.microsoft.com/office/drawing/2010/main">
+        <mc:Choice Requires="a14">
           <p:sp>
             <p:nvSpPr>
               <p:cNvPr id="6" name="Content Placeholder 5">
@@ -14091,7 +14092,7 @@
             </p:txBody>
           </p:sp>
         </mc:Choice>
-        <mc:Fallback>
+        <mc:Fallback xmlns="">
           <p:sp>
             <p:nvSpPr>
               <p:cNvPr id="6" name="Content Placeholder 5">
@@ -14338,8 +14339,8 @@
               </p:txBody>
             </p:sp>
           </p:grpSp>
-          <mc:AlternateContent xmlns:mc="http://schemas.openxmlformats.org/markup-compatibility/2006">
-            <mc:Choice xmlns:p14="http://schemas.microsoft.com/office/powerpoint/2010/main" Requires="p14">
+          <mc:AlternateContent xmlns:mc="http://schemas.openxmlformats.org/markup-compatibility/2006" xmlns:p14="http://schemas.microsoft.com/office/powerpoint/2010/main">
+            <mc:Choice Requires="p14">
               <p:contentPart p14:bwMode="auto" r:id="rId5">
                 <p14:nvContentPartPr>
                   <p14:cNvPr id="8" name="Ink 7">
@@ -14358,7 +14359,7 @@
                 </p14:xfrm>
               </p:contentPart>
             </mc:Choice>
-            <mc:Fallback>
+            <mc:Fallback xmlns="">
               <p:pic>
                 <p:nvPicPr>
                   <p:cNvPr id="8" name="Ink 7">
@@ -14390,8 +14391,8 @@
             </mc:Fallback>
           </mc:AlternateContent>
         </p:grpSp>
-        <mc:AlternateContent xmlns:mc="http://schemas.openxmlformats.org/markup-compatibility/2006">
-          <mc:Choice xmlns:p14="http://schemas.microsoft.com/office/powerpoint/2010/main" Requires="p14">
+        <mc:AlternateContent xmlns:mc="http://schemas.openxmlformats.org/markup-compatibility/2006" xmlns:p14="http://schemas.microsoft.com/office/powerpoint/2010/main">
+          <mc:Choice Requires="p14">
             <p:contentPart p14:bwMode="auto" r:id="rId7">
               <p14:nvContentPartPr>
                 <p14:cNvPr id="9" name="Ink 8">
@@ -14410,7 +14411,7 @@
               </p14:xfrm>
             </p:contentPart>
           </mc:Choice>
-          <mc:Fallback>
+          <mc:Fallback xmlns="">
             <p:pic>
               <p:nvPicPr>
                 <p:cNvPr id="9" name="Ink 8">
@@ -14442,8 +14443,8 @@
           </mc:Fallback>
         </mc:AlternateContent>
       </p:grpSp>
-      <mc:AlternateContent xmlns:mc="http://schemas.openxmlformats.org/markup-compatibility/2006">
-        <mc:Choice xmlns:p14="http://schemas.microsoft.com/office/powerpoint/2010/main" Requires="p14">
+      <mc:AlternateContent xmlns:mc="http://schemas.openxmlformats.org/markup-compatibility/2006" xmlns:p14="http://schemas.microsoft.com/office/powerpoint/2010/main">
+        <mc:Choice Requires="p14">
           <p:contentPart p14:bwMode="auto" r:id="rId9">
             <p14:nvContentPartPr>
               <p14:cNvPr id="10" name="Ink 9">
@@ -14462,7 +14463,7 @@
             </p14:xfrm>
           </p:contentPart>
         </mc:Choice>
-        <mc:Fallback>
+        <mc:Fallback xmlns="">
           <p:pic>
             <p:nvPicPr>
               <p:cNvPr id="10" name="Ink 9">
@@ -14970,16 +14971,119 @@
           <a:p>
             <a:pPr lvl="1"/>
             <a:r>
-              <a:rPr lang="en-US" sz="2400" dirty="0"/>
-              <a:t>Exploring Exponential and Logistic models</a:t>
+              <a:rPr lang="en-US" sz="2800" dirty="0"/>
+              <a:t>Exploring the Logistic model</a:t>
             </a:r>
           </a:p>
           <a:p>
             <a:pPr lvl="2"/>
             <a:r>
+              <a:rPr lang="en-US" sz="2400" dirty="0"/>
+              <a:t>This tutorial compares the dynamics of the logistic model in 4 parts</a:t>
+            </a:r>
+          </a:p>
+          <a:p>
+            <a:pPr marL="1081278" lvl="3" indent="-514350">
+              <a:buFont typeface="+mj-lt"/>
+              <a:buAutoNum type="arabicPeriod"/>
+            </a:pPr>
+            <a:r>
+              <a:rPr lang="en-US" sz="2200" dirty="0"/>
+              <a:t>Explore ‘deterministic’ population dynamics </a:t>
+            </a:r>
+          </a:p>
+          <a:p>
+            <a:pPr lvl="5"/>
+            <a:r>
               <a:rPr lang="en-US" sz="2000" dirty="0"/>
-              <a:t>This</a:t>
+              <a:t>No variability</a:t>
             </a:r>
+          </a:p>
+          <a:p>
+            <a:pPr marL="1081278" lvl="3" indent="-514350">
+              <a:buFont typeface="+mj-lt"/>
+              <a:buAutoNum type="arabicPeriod"/>
+            </a:pPr>
+            <a:r>
+              <a:rPr lang="en-US" sz="2200" dirty="0"/>
+              <a:t>Explore ‘stochastic’ population dynamics </a:t>
+            </a:r>
+          </a:p>
+          <a:p>
+            <a:pPr lvl="5"/>
+            <a:r>
+              <a:rPr lang="en-US" sz="2000" dirty="0"/>
+              <a:t>Allow </a:t>
+            </a:r>
+            <a:r>
+              <a:rPr lang="en-US" sz="2000" i="1" dirty="0"/>
+              <a:t>r (</a:t>
+            </a:r>
+            <a:r>
+              <a:rPr lang="en-US" sz="2000" dirty="0"/>
+              <a:t>intrinsic rate of growth) to vary over time</a:t>
+            </a:r>
+          </a:p>
+          <a:p>
+            <a:pPr lvl="5"/>
+            <a:r>
+              <a:rPr lang="en-US" sz="2000" dirty="0"/>
+              <a:t>Runs a series of simulations to explore variability in population growth</a:t>
+            </a:r>
+          </a:p>
+          <a:p>
+            <a:pPr marL="1081278" lvl="3" indent="-514350">
+              <a:buFont typeface="+mj-lt"/>
+              <a:buAutoNum type="arabicPeriod"/>
+            </a:pPr>
+            <a:r>
+              <a:rPr lang="en-US" sz="2200" dirty="0"/>
+              <a:t>Explore deterministic population dynamics with harvesting</a:t>
+            </a:r>
+          </a:p>
+          <a:p>
+            <a:pPr lvl="5"/>
+            <a:r>
+              <a:rPr lang="en-US" sz="2000" dirty="0"/>
+              <a:t>Harvesting a ‘fixed’ quota of animals</a:t>
+            </a:r>
+          </a:p>
+          <a:p>
+            <a:pPr lvl="5"/>
+            <a:r>
+              <a:rPr lang="en-US" sz="2000" dirty="0"/>
+              <a:t>Initial example has a harvest set at the Maximum Population Growth (MPG)</a:t>
+            </a:r>
+          </a:p>
+          <a:p>
+            <a:pPr lvl="6"/>
+            <a:r>
+              <a:rPr lang="en-US" sz="1800" dirty="0"/>
+              <a:t>You can tweak the harvest ‘quota’ to explore effect on population</a:t>
+            </a:r>
+          </a:p>
+          <a:p>
+            <a:pPr marL="1081278" lvl="3" indent="-514350">
+              <a:buFont typeface="+mj-lt"/>
+              <a:buAutoNum type="arabicPeriod"/>
+            </a:pPr>
+            <a:r>
+              <a:rPr lang="en-US" sz="2200" dirty="0"/>
+              <a:t>Explore ‘stochastic’ population dynamics with harvesting</a:t>
+            </a:r>
+          </a:p>
+          <a:p>
+            <a:pPr lvl="5"/>
+            <a:r>
+              <a:rPr lang="en-US" sz="2000" dirty="0"/>
+              <a:t>Combines (3) and (4) to show how variability effects the population when the harvest quota is fixed</a:t>
+            </a:r>
+          </a:p>
+          <a:p>
+            <a:pPr marL="1081278" lvl="3" indent="-514350">
+              <a:buFont typeface="+mj-lt"/>
+              <a:buAutoNum type="arabicPeriod"/>
+            </a:pPr>
             <a:endParaRPr lang="en-US" sz="2600" dirty="0"/>
           </a:p>
         </p:txBody>
@@ -15031,6 +15135,545 @@
                                           <p:spTgt spid="6">
                                             <p:txEl>
                                               <p:pRg st="1" end="1"/>
+                                            </p:txEl>
+                                          </p:spTgt>
+                                        </p:tgtEl>
+                                        <p:attrNameLst>
+                                          <p:attrName>style.visibility</p:attrName>
+                                        </p:attrNameLst>
+                                      </p:cBhvr>
+                                      <p:to>
+                                        <p:strVal val="visible"/>
+                                      </p:to>
+                                    </p:set>
+                                  </p:childTnLst>
+                                </p:cTn>
+                              </p:par>
+                            </p:childTnLst>
+                          </p:cTn>
+                        </p:par>
+                      </p:childTnLst>
+                    </p:cTn>
+                  </p:par>
+                  <p:par>
+                    <p:cTn id="7" fill="hold">
+                      <p:stCondLst>
+                        <p:cond delay="indefinite"/>
+                      </p:stCondLst>
+                      <p:childTnLst>
+                        <p:par>
+                          <p:cTn id="8" fill="hold">
+                            <p:stCondLst>
+                              <p:cond delay="0"/>
+                            </p:stCondLst>
+                            <p:childTnLst>
+                              <p:par>
+                                <p:cTn id="9" presetID="1" presetClass="entr" presetSubtype="0" fill="hold" nodeType="clickEffect">
+                                  <p:stCondLst>
+                                    <p:cond delay="0"/>
+                                  </p:stCondLst>
+                                  <p:childTnLst>
+                                    <p:set>
+                                      <p:cBhvr>
+                                        <p:cTn id="10" dur="1" fill="hold">
+                                          <p:stCondLst>
+                                            <p:cond delay="0"/>
+                                          </p:stCondLst>
+                                        </p:cTn>
+                                        <p:tgtEl>
+                                          <p:spTgt spid="6">
+                                            <p:txEl>
+                                              <p:pRg st="2" end="2"/>
+                                            </p:txEl>
+                                          </p:spTgt>
+                                        </p:tgtEl>
+                                        <p:attrNameLst>
+                                          <p:attrName>style.visibility</p:attrName>
+                                        </p:attrNameLst>
+                                      </p:cBhvr>
+                                      <p:to>
+                                        <p:strVal val="visible"/>
+                                      </p:to>
+                                    </p:set>
+                                  </p:childTnLst>
+                                </p:cTn>
+                              </p:par>
+                            </p:childTnLst>
+                          </p:cTn>
+                        </p:par>
+                      </p:childTnLst>
+                    </p:cTn>
+                  </p:par>
+                  <p:par>
+                    <p:cTn id="11" fill="hold">
+                      <p:stCondLst>
+                        <p:cond delay="indefinite"/>
+                      </p:stCondLst>
+                      <p:childTnLst>
+                        <p:par>
+                          <p:cTn id="12" fill="hold">
+                            <p:stCondLst>
+                              <p:cond delay="0"/>
+                            </p:stCondLst>
+                            <p:childTnLst>
+                              <p:par>
+                                <p:cTn id="13" presetID="1" presetClass="entr" presetSubtype="0" fill="hold" nodeType="clickEffect">
+                                  <p:stCondLst>
+                                    <p:cond delay="0"/>
+                                  </p:stCondLst>
+                                  <p:childTnLst>
+                                    <p:set>
+                                      <p:cBhvr>
+                                        <p:cTn id="14" dur="1" fill="hold">
+                                          <p:stCondLst>
+                                            <p:cond delay="0"/>
+                                          </p:stCondLst>
+                                        </p:cTn>
+                                        <p:tgtEl>
+                                          <p:spTgt spid="6">
+                                            <p:txEl>
+                                              <p:pRg st="3" end="3"/>
+                                            </p:txEl>
+                                          </p:spTgt>
+                                        </p:tgtEl>
+                                        <p:attrNameLst>
+                                          <p:attrName>style.visibility</p:attrName>
+                                        </p:attrNameLst>
+                                      </p:cBhvr>
+                                      <p:to>
+                                        <p:strVal val="visible"/>
+                                      </p:to>
+                                    </p:set>
+                                  </p:childTnLst>
+                                </p:cTn>
+                              </p:par>
+                            </p:childTnLst>
+                          </p:cTn>
+                        </p:par>
+                      </p:childTnLst>
+                    </p:cTn>
+                  </p:par>
+                  <p:par>
+                    <p:cTn id="15" fill="hold">
+                      <p:stCondLst>
+                        <p:cond delay="indefinite"/>
+                      </p:stCondLst>
+                      <p:childTnLst>
+                        <p:par>
+                          <p:cTn id="16" fill="hold">
+                            <p:stCondLst>
+                              <p:cond delay="0"/>
+                            </p:stCondLst>
+                            <p:childTnLst>
+                              <p:par>
+                                <p:cTn id="17" presetID="1" presetClass="entr" presetSubtype="0" fill="hold" nodeType="clickEffect">
+                                  <p:stCondLst>
+                                    <p:cond delay="0"/>
+                                  </p:stCondLst>
+                                  <p:childTnLst>
+                                    <p:set>
+                                      <p:cBhvr>
+                                        <p:cTn id="18" dur="1" fill="hold">
+                                          <p:stCondLst>
+                                            <p:cond delay="0"/>
+                                          </p:stCondLst>
+                                        </p:cTn>
+                                        <p:tgtEl>
+                                          <p:spTgt spid="6">
+                                            <p:txEl>
+                                              <p:pRg st="4" end="4"/>
+                                            </p:txEl>
+                                          </p:spTgt>
+                                        </p:tgtEl>
+                                        <p:attrNameLst>
+                                          <p:attrName>style.visibility</p:attrName>
+                                        </p:attrNameLst>
+                                      </p:cBhvr>
+                                      <p:to>
+                                        <p:strVal val="visible"/>
+                                      </p:to>
+                                    </p:set>
+                                  </p:childTnLst>
+                                </p:cTn>
+                              </p:par>
+                            </p:childTnLst>
+                          </p:cTn>
+                        </p:par>
+                      </p:childTnLst>
+                    </p:cTn>
+                  </p:par>
+                  <p:par>
+                    <p:cTn id="19" fill="hold">
+                      <p:stCondLst>
+                        <p:cond delay="indefinite"/>
+                      </p:stCondLst>
+                      <p:childTnLst>
+                        <p:par>
+                          <p:cTn id="20" fill="hold">
+                            <p:stCondLst>
+                              <p:cond delay="0"/>
+                            </p:stCondLst>
+                            <p:childTnLst>
+                              <p:par>
+                                <p:cTn id="21" presetID="1" presetClass="entr" presetSubtype="0" fill="hold" nodeType="clickEffect">
+                                  <p:stCondLst>
+                                    <p:cond delay="0"/>
+                                  </p:stCondLst>
+                                  <p:childTnLst>
+                                    <p:set>
+                                      <p:cBhvr>
+                                        <p:cTn id="22" dur="1" fill="hold">
+                                          <p:stCondLst>
+                                            <p:cond delay="0"/>
+                                          </p:stCondLst>
+                                        </p:cTn>
+                                        <p:tgtEl>
+                                          <p:spTgt spid="6">
+                                            <p:txEl>
+                                              <p:pRg st="5" end="5"/>
+                                            </p:txEl>
+                                          </p:spTgt>
+                                        </p:tgtEl>
+                                        <p:attrNameLst>
+                                          <p:attrName>style.visibility</p:attrName>
+                                        </p:attrNameLst>
+                                      </p:cBhvr>
+                                      <p:to>
+                                        <p:strVal val="visible"/>
+                                      </p:to>
+                                    </p:set>
+                                  </p:childTnLst>
+                                </p:cTn>
+                              </p:par>
+                            </p:childTnLst>
+                          </p:cTn>
+                        </p:par>
+                      </p:childTnLst>
+                    </p:cTn>
+                  </p:par>
+                  <p:par>
+                    <p:cTn id="23" fill="hold">
+                      <p:stCondLst>
+                        <p:cond delay="indefinite"/>
+                      </p:stCondLst>
+                      <p:childTnLst>
+                        <p:par>
+                          <p:cTn id="24" fill="hold">
+                            <p:stCondLst>
+                              <p:cond delay="0"/>
+                            </p:stCondLst>
+                            <p:childTnLst>
+                              <p:par>
+                                <p:cTn id="25" presetID="1" presetClass="entr" presetSubtype="0" fill="hold" nodeType="clickEffect">
+                                  <p:stCondLst>
+                                    <p:cond delay="0"/>
+                                  </p:stCondLst>
+                                  <p:childTnLst>
+                                    <p:set>
+                                      <p:cBhvr>
+                                        <p:cTn id="26" dur="1" fill="hold">
+                                          <p:stCondLst>
+                                            <p:cond delay="0"/>
+                                          </p:stCondLst>
+                                        </p:cTn>
+                                        <p:tgtEl>
+                                          <p:spTgt spid="6">
+                                            <p:txEl>
+                                              <p:pRg st="6" end="6"/>
+                                            </p:txEl>
+                                          </p:spTgt>
+                                        </p:tgtEl>
+                                        <p:attrNameLst>
+                                          <p:attrName>style.visibility</p:attrName>
+                                        </p:attrNameLst>
+                                      </p:cBhvr>
+                                      <p:to>
+                                        <p:strVal val="visible"/>
+                                      </p:to>
+                                    </p:set>
+                                  </p:childTnLst>
+                                </p:cTn>
+                              </p:par>
+                            </p:childTnLst>
+                          </p:cTn>
+                        </p:par>
+                      </p:childTnLst>
+                    </p:cTn>
+                  </p:par>
+                  <p:par>
+                    <p:cTn id="27" fill="hold">
+                      <p:stCondLst>
+                        <p:cond delay="indefinite"/>
+                      </p:stCondLst>
+                      <p:childTnLst>
+                        <p:par>
+                          <p:cTn id="28" fill="hold">
+                            <p:stCondLst>
+                              <p:cond delay="0"/>
+                            </p:stCondLst>
+                            <p:childTnLst>
+                              <p:par>
+                                <p:cTn id="29" presetID="1" presetClass="entr" presetSubtype="0" fill="hold" nodeType="clickEffect">
+                                  <p:stCondLst>
+                                    <p:cond delay="0"/>
+                                  </p:stCondLst>
+                                  <p:childTnLst>
+                                    <p:set>
+                                      <p:cBhvr>
+                                        <p:cTn id="30" dur="1" fill="hold">
+                                          <p:stCondLst>
+                                            <p:cond delay="0"/>
+                                          </p:stCondLst>
+                                        </p:cTn>
+                                        <p:tgtEl>
+                                          <p:spTgt spid="6">
+                                            <p:txEl>
+                                              <p:pRg st="7" end="7"/>
+                                            </p:txEl>
+                                          </p:spTgt>
+                                        </p:tgtEl>
+                                        <p:attrNameLst>
+                                          <p:attrName>style.visibility</p:attrName>
+                                        </p:attrNameLst>
+                                      </p:cBhvr>
+                                      <p:to>
+                                        <p:strVal val="visible"/>
+                                      </p:to>
+                                    </p:set>
+                                  </p:childTnLst>
+                                </p:cTn>
+                              </p:par>
+                            </p:childTnLst>
+                          </p:cTn>
+                        </p:par>
+                      </p:childTnLst>
+                    </p:cTn>
+                  </p:par>
+                  <p:par>
+                    <p:cTn id="31" fill="hold">
+                      <p:stCondLst>
+                        <p:cond delay="indefinite"/>
+                      </p:stCondLst>
+                      <p:childTnLst>
+                        <p:par>
+                          <p:cTn id="32" fill="hold">
+                            <p:stCondLst>
+                              <p:cond delay="0"/>
+                            </p:stCondLst>
+                            <p:childTnLst>
+                              <p:par>
+                                <p:cTn id="33" presetID="1" presetClass="entr" presetSubtype="0" fill="hold" nodeType="clickEffect">
+                                  <p:stCondLst>
+                                    <p:cond delay="0"/>
+                                  </p:stCondLst>
+                                  <p:childTnLst>
+                                    <p:set>
+                                      <p:cBhvr>
+                                        <p:cTn id="34" dur="1" fill="hold">
+                                          <p:stCondLst>
+                                            <p:cond delay="0"/>
+                                          </p:stCondLst>
+                                        </p:cTn>
+                                        <p:tgtEl>
+                                          <p:spTgt spid="6">
+                                            <p:txEl>
+                                              <p:pRg st="8" end="8"/>
+                                            </p:txEl>
+                                          </p:spTgt>
+                                        </p:tgtEl>
+                                        <p:attrNameLst>
+                                          <p:attrName>style.visibility</p:attrName>
+                                        </p:attrNameLst>
+                                      </p:cBhvr>
+                                      <p:to>
+                                        <p:strVal val="visible"/>
+                                      </p:to>
+                                    </p:set>
+                                  </p:childTnLst>
+                                </p:cTn>
+                              </p:par>
+                            </p:childTnLst>
+                          </p:cTn>
+                        </p:par>
+                      </p:childTnLst>
+                    </p:cTn>
+                  </p:par>
+                  <p:par>
+                    <p:cTn id="35" fill="hold">
+                      <p:stCondLst>
+                        <p:cond delay="indefinite"/>
+                      </p:stCondLst>
+                      <p:childTnLst>
+                        <p:par>
+                          <p:cTn id="36" fill="hold">
+                            <p:stCondLst>
+                              <p:cond delay="0"/>
+                            </p:stCondLst>
+                            <p:childTnLst>
+                              <p:par>
+                                <p:cTn id="37" presetID="1" presetClass="entr" presetSubtype="0" fill="hold" nodeType="clickEffect">
+                                  <p:stCondLst>
+                                    <p:cond delay="0"/>
+                                  </p:stCondLst>
+                                  <p:childTnLst>
+                                    <p:set>
+                                      <p:cBhvr>
+                                        <p:cTn id="38" dur="1" fill="hold">
+                                          <p:stCondLst>
+                                            <p:cond delay="0"/>
+                                          </p:stCondLst>
+                                        </p:cTn>
+                                        <p:tgtEl>
+                                          <p:spTgt spid="6">
+                                            <p:txEl>
+                                              <p:pRg st="9" end="9"/>
+                                            </p:txEl>
+                                          </p:spTgt>
+                                        </p:tgtEl>
+                                        <p:attrNameLst>
+                                          <p:attrName>style.visibility</p:attrName>
+                                        </p:attrNameLst>
+                                      </p:cBhvr>
+                                      <p:to>
+                                        <p:strVal val="visible"/>
+                                      </p:to>
+                                    </p:set>
+                                  </p:childTnLst>
+                                </p:cTn>
+                              </p:par>
+                            </p:childTnLst>
+                          </p:cTn>
+                        </p:par>
+                      </p:childTnLst>
+                    </p:cTn>
+                  </p:par>
+                  <p:par>
+                    <p:cTn id="39" fill="hold">
+                      <p:stCondLst>
+                        <p:cond delay="indefinite"/>
+                      </p:stCondLst>
+                      <p:childTnLst>
+                        <p:par>
+                          <p:cTn id="40" fill="hold">
+                            <p:stCondLst>
+                              <p:cond delay="0"/>
+                            </p:stCondLst>
+                            <p:childTnLst>
+                              <p:par>
+                                <p:cTn id="41" presetID="1" presetClass="entr" presetSubtype="0" fill="hold" nodeType="clickEffect">
+                                  <p:stCondLst>
+                                    <p:cond delay="0"/>
+                                  </p:stCondLst>
+                                  <p:childTnLst>
+                                    <p:set>
+                                      <p:cBhvr>
+                                        <p:cTn id="42" dur="1" fill="hold">
+                                          <p:stCondLst>
+                                            <p:cond delay="0"/>
+                                          </p:stCondLst>
+                                        </p:cTn>
+                                        <p:tgtEl>
+                                          <p:spTgt spid="6">
+                                            <p:txEl>
+                                              <p:pRg st="10" end="10"/>
+                                            </p:txEl>
+                                          </p:spTgt>
+                                        </p:tgtEl>
+                                        <p:attrNameLst>
+                                          <p:attrName>style.visibility</p:attrName>
+                                        </p:attrNameLst>
+                                      </p:cBhvr>
+                                      <p:to>
+                                        <p:strVal val="visible"/>
+                                      </p:to>
+                                    </p:set>
+                                  </p:childTnLst>
+                                </p:cTn>
+                              </p:par>
+                            </p:childTnLst>
+                          </p:cTn>
+                        </p:par>
+                      </p:childTnLst>
+                    </p:cTn>
+                  </p:par>
+                  <p:par>
+                    <p:cTn id="43" fill="hold">
+                      <p:stCondLst>
+                        <p:cond delay="indefinite"/>
+                      </p:stCondLst>
+                      <p:childTnLst>
+                        <p:par>
+                          <p:cTn id="44" fill="hold">
+                            <p:stCondLst>
+                              <p:cond delay="0"/>
+                            </p:stCondLst>
+                            <p:childTnLst>
+                              <p:par>
+                                <p:cTn id="45" presetID="1" presetClass="entr" presetSubtype="0" fill="hold" nodeType="clickEffect">
+                                  <p:stCondLst>
+                                    <p:cond delay="0"/>
+                                  </p:stCondLst>
+                                  <p:childTnLst>
+                                    <p:set>
+                                      <p:cBhvr>
+                                        <p:cTn id="46" dur="1" fill="hold">
+                                          <p:stCondLst>
+                                            <p:cond delay="0"/>
+                                          </p:stCondLst>
+                                        </p:cTn>
+                                        <p:tgtEl>
+                                          <p:spTgt spid="6">
+                                            <p:txEl>
+                                              <p:pRg st="11" end="11"/>
+                                            </p:txEl>
+                                          </p:spTgt>
+                                        </p:tgtEl>
+                                        <p:attrNameLst>
+                                          <p:attrName>style.visibility</p:attrName>
+                                        </p:attrNameLst>
+                                      </p:cBhvr>
+                                      <p:to>
+                                        <p:strVal val="visible"/>
+                                      </p:to>
+                                    </p:set>
+                                  </p:childTnLst>
+                                </p:cTn>
+                              </p:par>
+                            </p:childTnLst>
+                          </p:cTn>
+                        </p:par>
+                      </p:childTnLst>
+                    </p:cTn>
+                  </p:par>
+                  <p:par>
+                    <p:cTn id="47" fill="hold">
+                      <p:stCondLst>
+                        <p:cond delay="indefinite"/>
+                      </p:stCondLst>
+                      <p:childTnLst>
+                        <p:par>
+                          <p:cTn id="48" fill="hold">
+                            <p:stCondLst>
+                              <p:cond delay="0"/>
+                            </p:stCondLst>
+                            <p:childTnLst>
+                              <p:par>
+                                <p:cTn id="49" presetID="1" presetClass="entr" presetSubtype="0" fill="hold" nodeType="clickEffect">
+                                  <p:stCondLst>
+                                    <p:cond delay="0"/>
+                                  </p:stCondLst>
+                                  <p:childTnLst>
+                                    <p:set>
+                                      <p:cBhvr>
+                                        <p:cTn id="50" dur="1" fill="hold">
+                                          <p:stCondLst>
+                                            <p:cond delay="0"/>
+                                          </p:stCondLst>
+                                        </p:cTn>
+                                        <p:tgtEl>
+                                          <p:spTgt spid="6">
+                                            <p:txEl>
+                                              <p:pRg st="12" end="12"/>
                                             </p:txEl>
                                           </p:spTgt>
                                         </p:tgtEl>
@@ -15632,7 +16275,7 @@
         </p:nvSpPr>
         <p:spPr>
           <a:xfrm>
-            <a:off x="139009" y="3147090"/>
+            <a:off x="5351013" y="1549630"/>
             <a:ext cx="3076483" cy="584775"/>
           </a:xfrm>
           <a:prstGeom prst="rect">
@@ -15675,7 +16318,7 @@
         </p:nvSpPr>
         <p:spPr>
           <a:xfrm>
-            <a:off x="8165155" y="1421321"/>
+            <a:off x="2642323" y="3330122"/>
             <a:ext cx="3835237" cy="707886"/>
           </a:xfrm>
           <a:prstGeom prst="rect">
@@ -15894,8 +16537,8 @@
         </p:nvSpPr>
         <p:spPr>
           <a:xfrm>
-            <a:off x="2680882" y="2877245"/>
-            <a:ext cx="3714160" cy="707886"/>
+            <a:off x="4464223" y="2746090"/>
+            <a:ext cx="2065895" cy="707886"/>
           </a:xfrm>
           <a:prstGeom prst="rect">
             <a:avLst/>
@@ -15917,7 +16560,7 @@
               <a:rPr lang="en-US" sz="4000" dirty="0">
                 <a:latin typeface="Algerian" panose="04020705040A02060702" pitchFamily="82" charset="0"/>
               </a:rPr>
-              <a:t>Elasticity</a:t>
+              <a:t>Quota</a:t>
             </a:r>
           </a:p>
         </p:txBody>
@@ -16062,7 +16705,7 @@
         </p:nvSpPr>
         <p:spPr>
           <a:xfrm>
-            <a:off x="6408252" y="3350133"/>
+            <a:off x="5856261" y="3476475"/>
             <a:ext cx="3421129" cy="584775"/>
           </a:xfrm>
           <a:prstGeom prst="rect">
@@ -16087,6 +16730,133 @@
                 <a:cs typeface="Aharoni" panose="02010803020104030203" pitchFamily="2" charset="-79"/>
               </a:rPr>
               <a:t>Carrying Capacity</a:t>
+            </a:r>
+          </a:p>
+        </p:txBody>
+      </p:sp>
+      <p:sp>
+        <p:nvSpPr>
+          <p:cNvPr id="19" name="TextBox 18">
+            <a:extLst>
+              <a:ext uri="{FF2B5EF4-FFF2-40B4-BE49-F238E27FC236}">
+                <a16:creationId xmlns:a16="http://schemas.microsoft.com/office/drawing/2014/main" id="{1C3CE557-5007-41AC-9790-5B5E942F19D0}"/>
+              </a:ext>
+            </a:extLst>
+          </p:cNvPr>
+          <p:cNvSpPr txBox="1"/>
+          <p:nvPr/>
+        </p:nvSpPr>
+        <p:spPr>
+          <a:xfrm>
+            <a:off x="9611757" y="1721808"/>
+            <a:ext cx="2089634" cy="646331"/>
+          </a:xfrm>
+          <a:prstGeom prst="rect">
+            <a:avLst/>
+          </a:prstGeom>
+          <a:noFill/>
+          <a:ln>
+            <a:solidFill>
+              <a:schemeClr val="accent1"/>
+            </a:solidFill>
+          </a:ln>
+        </p:spPr>
+        <p:txBody>
+          <a:bodyPr wrap="square" rtlCol="0">
+            <a:spAutoFit/>
+          </a:bodyPr>
+          <a:lstStyle/>
+          <a:p>
+            <a:r>
+              <a:rPr lang="en-US" sz="3600" dirty="0">
+                <a:latin typeface="Franklin Gothic Medium Cond" panose="020B0606030402020204" pitchFamily="34" charset="0"/>
+              </a:rPr>
+              <a:t>Harvesting</a:t>
+            </a:r>
+          </a:p>
+        </p:txBody>
+      </p:sp>
+      <p:sp>
+        <p:nvSpPr>
+          <p:cNvPr id="26" name="TextBox 25">
+            <a:extLst>
+              <a:ext uri="{FF2B5EF4-FFF2-40B4-BE49-F238E27FC236}">
+                <a16:creationId xmlns:a16="http://schemas.microsoft.com/office/drawing/2014/main" id="{9C212ED9-28FF-4733-B5E6-F17C78093F08}"/>
+              </a:ext>
+            </a:extLst>
+          </p:cNvPr>
+          <p:cNvSpPr txBox="1"/>
+          <p:nvPr/>
+        </p:nvSpPr>
+        <p:spPr>
+          <a:xfrm>
+            <a:off x="9039325" y="1093306"/>
+            <a:ext cx="2961067" cy="584775"/>
+          </a:xfrm>
+          <a:prstGeom prst="rect">
+            <a:avLst/>
+          </a:prstGeom>
+          <a:noFill/>
+          <a:ln>
+            <a:solidFill>
+              <a:schemeClr val="accent1"/>
+            </a:solidFill>
+          </a:ln>
+        </p:spPr>
+        <p:txBody>
+          <a:bodyPr wrap="none" rtlCol="0">
+            <a:spAutoFit/>
+          </a:bodyPr>
+          <a:lstStyle/>
+          <a:p>
+            <a:r>
+              <a:rPr lang="en-US" sz="3200" dirty="0">
+                <a:latin typeface="Arial Rounded MT Bold" panose="020F0704030504030204" pitchFamily="34" charset="0"/>
+              </a:rPr>
+              <a:t>Deterministic </a:t>
+            </a:r>
+          </a:p>
+        </p:txBody>
+      </p:sp>
+      <p:sp>
+        <p:nvSpPr>
+          <p:cNvPr id="28" name="TextBox 27">
+            <a:extLst>
+              <a:ext uri="{FF2B5EF4-FFF2-40B4-BE49-F238E27FC236}">
+                <a16:creationId xmlns:a16="http://schemas.microsoft.com/office/drawing/2014/main" id="{607D5746-B514-4A20-AB8C-2CBC21A3D8EB}"/>
+              </a:ext>
+            </a:extLst>
+          </p:cNvPr>
+          <p:cNvSpPr txBox="1"/>
+          <p:nvPr/>
+        </p:nvSpPr>
+        <p:spPr>
+          <a:xfrm>
+            <a:off x="660023" y="2854768"/>
+            <a:ext cx="2201244" cy="584775"/>
+          </a:xfrm>
+          <a:prstGeom prst="rect">
+            <a:avLst/>
+          </a:prstGeom>
+          <a:noFill/>
+          <a:ln>
+            <a:solidFill>
+              <a:schemeClr val="accent1"/>
+            </a:solidFill>
+          </a:ln>
+        </p:spPr>
+        <p:txBody>
+          <a:bodyPr wrap="none" rtlCol="0">
+            <a:spAutoFit/>
+          </a:bodyPr>
+          <a:lstStyle/>
+          <a:p>
+            <a:r>
+              <a:rPr lang="en-US" sz="3200" dirty="0">
+                <a:latin typeface="Aharoni" panose="02010803020104030203" pitchFamily="2" charset="-79"/>
+                <a:cs typeface="Aharoni" panose="02010803020104030203" pitchFamily="2" charset="-79"/>
+              </a:rPr>
+              <a:t>Stochastic </a:t>
             </a:r>
           </a:p>
         </p:txBody>
@@ -16812,8 +17582,8 @@
           <a:chExt cx="0" cy="0"/>
         </a:xfrm>
       </p:grpSpPr>
-      <mc:AlternateContent xmlns:mc="http://schemas.openxmlformats.org/markup-compatibility/2006">
-        <mc:Choice xmlns:a14="http://schemas.microsoft.com/office/drawing/2010/main" Requires="a14">
+      <mc:AlternateContent xmlns:mc="http://schemas.openxmlformats.org/markup-compatibility/2006" xmlns:a14="http://schemas.microsoft.com/office/drawing/2010/main">
+        <mc:Choice Requires="a14">
           <p:sp>
             <p:nvSpPr>
               <p:cNvPr id="6" name="Content Placeholder 5">
@@ -17064,7 +17834,7 @@
             </p:txBody>
           </p:sp>
         </mc:Choice>
-        <mc:Fallback>
+        <mc:Fallback xmlns="">
           <p:sp>
             <p:nvSpPr>
               <p:cNvPr id="6" name="Content Placeholder 5">
@@ -17545,8 +18315,8 @@
           </a:p>
         </p:txBody>
       </p:sp>
-      <mc:AlternateContent xmlns:mc="http://schemas.openxmlformats.org/markup-compatibility/2006">
-        <mc:Choice xmlns:a14="http://schemas.microsoft.com/office/drawing/2010/main" Requires="a14">
+      <mc:AlternateContent xmlns:mc="http://schemas.openxmlformats.org/markup-compatibility/2006" xmlns:a14="http://schemas.microsoft.com/office/drawing/2010/main">
+        <mc:Choice Requires="a14">
           <p:sp>
             <p:nvSpPr>
               <p:cNvPr id="6" name="Content Placeholder 5">
@@ -17928,7 +18698,7 @@
             </p:txBody>
           </p:sp>
         </mc:Choice>
-        <mc:Fallback>
+        <mc:Fallback xmlns="">
           <p:sp>
             <p:nvSpPr>
               <p:cNvPr id="6" name="Content Placeholder 5">
@@ -18434,8 +19204,8 @@
           <a:chExt cx="0" cy="0"/>
         </a:xfrm>
       </p:grpSpPr>
-      <mc:AlternateContent xmlns:mc="http://schemas.openxmlformats.org/markup-compatibility/2006">
-        <mc:Choice xmlns:a14="http://schemas.microsoft.com/office/drawing/2010/main" Requires="a14">
+      <mc:AlternateContent xmlns:mc="http://schemas.openxmlformats.org/markup-compatibility/2006" xmlns:a14="http://schemas.microsoft.com/office/drawing/2010/main">
+        <mc:Choice Requires="a14">
           <p:sp>
             <p:nvSpPr>
               <p:cNvPr id="6" name="Content Placeholder 5">
@@ -18742,7 +19512,7 @@
             </p:txBody>
           </p:sp>
         </mc:Choice>
-        <mc:Fallback>
+        <mc:Fallback xmlns="">
           <p:sp>
             <p:nvSpPr>
               <p:cNvPr id="6" name="Content Placeholder 5">
@@ -19280,8 +20050,8 @@
           </a:p>
         </p:txBody>
       </p:sp>
-      <mc:AlternateContent xmlns:mc="http://schemas.openxmlformats.org/markup-compatibility/2006">
-        <mc:Choice xmlns:a14="http://schemas.microsoft.com/office/drawing/2010/main" Requires="a14">
+      <mc:AlternateContent xmlns:mc="http://schemas.openxmlformats.org/markup-compatibility/2006" xmlns:a14="http://schemas.microsoft.com/office/drawing/2010/main">
+        <mc:Choice Requires="a14">
           <p:sp>
             <p:nvSpPr>
               <p:cNvPr id="6" name="Content Placeholder 5">
@@ -19609,7 +20379,7 @@
             </p:txBody>
           </p:sp>
         </mc:Choice>
-        <mc:Fallback>
+        <mc:Fallback xmlns="">
           <p:sp>
             <p:nvSpPr>
               <p:cNvPr id="6" name="Content Placeholder 5">

</xml_diff>